<commit_message>
Update pitch slides with corrected standards page numbers
</commit_message>
<xml_diff>
--- a/docs/pitch/week13_pitch.pptx
+++ b/docs/pitch/week13_pitch.pptx
@@ -3797,7 +3797,9 @@
         </p:nvSpPr>
         <p:spPr/>
         <p:txBody>
-          <a:bodyPr/>
+          <a:bodyPr>
+            <a:normAutofit fontScale="90000"/>
+          </a:bodyPr>
           <a:lstStyle/>
           <a:p>
             <a:r>
@@ -3872,7 +3874,9 @@
         </p:nvSpPr>
         <p:spPr/>
         <p:txBody>
-          <a:bodyPr/>
+          <a:bodyPr>
+            <a:normAutofit fontScale="90000"/>
+          </a:bodyPr>
           <a:lstStyle/>
           <a:p>
             <a:r>
@@ -3951,7 +3955,9 @@
         </p:nvSpPr>
         <p:spPr/>
         <p:txBody>
-          <a:bodyPr/>
+          <a:bodyPr>
+            <a:normAutofit fontScale="90000"/>
+          </a:bodyPr>
           <a:lstStyle/>
           <a:p>
             <a:r>
@@ -4030,7 +4036,9 @@
         </p:nvSpPr>
         <p:spPr/>
         <p:txBody>
-          <a:bodyPr/>
+          <a:bodyPr>
+            <a:normAutofit fontScale="90000"/>
+          </a:bodyPr>
           <a:lstStyle/>
           <a:p>
             <a:r>
@@ -4109,7 +4117,9 @@
         </p:nvSpPr>
         <p:spPr/>
         <p:txBody>
-          <a:bodyPr/>
+          <a:bodyPr>
+            <a:normAutofit fontScale="90000"/>
+          </a:bodyPr>
           <a:lstStyle/>
           <a:p>
             <a:r>
@@ -4130,28 +4140,50 @@
         </p:nvSpPr>
         <p:spPr/>
         <p:txBody>
-          <a:bodyPr/>
-          <a:lstStyle/>
-          <a:p>
-            <a:r>
-              <a:t>CSF PR.PS-02 (Appendix A, p.24): “Software is maintained, replaced, and removed commensurate with risk.”</a:t>
+          <a:bodyPr>
+            <a:normAutofit lnSpcReduction="10000"/>
+          </a:bodyPr>
+          <a:lstStyle/>
+          <a:p>
+            <a:r>
+              <a:rPr dirty="0"/>
+              <a:t>CSF PR.PS-02 (Appendix A, p.</a:t>
+            </a:r>
+            <a:r>
+              <a:rPr lang="en-US" dirty="0"/>
+              <a:t> 20</a:t>
+            </a:r>
+            <a:r>
+              <a:rPr dirty="0"/>
+              <a:t>): “Software is maintained, replaced, and removed commensurate with risk.”</a:t>
             </a:r>
           </a:p>
           <a:p>
             <a:pPr lvl="1"/>
             <a:r>
+              <a:rPr dirty="0"/>
               <a:t>How satisfied: Compensating authentication and monitoring controls mitigate delayed patching risk</a:t>
             </a:r>
           </a:p>
           <a:p>
             <a:pPr lvl="1"/>
             <a:r>
-              <a:t>Zero Trust Tenet (SP 800-207, p.14): “All data sources and computing services are considered resources.”</a:t>
+              <a:rPr dirty="0"/>
+              <a:t>Zero Trust Tenet (SP 800-207, p.</a:t>
+            </a:r>
+            <a:r>
+              <a:rPr lang="en-US" dirty="0"/>
+              <a:t> 6</a:t>
+            </a:r>
+            <a:r>
+              <a:rPr dirty="0"/>
+              <a:t>): “All data sources and computing services are considered resources.”</a:t>
             </a:r>
           </a:p>
           <a:p>
             <a:pPr lvl="1"/>
             <a:r>
+              <a:rPr dirty="0"/>
               <a:t>How satisfied: Biomedical devices are treated as managed, monitored resources</a:t>
             </a:r>
           </a:p>
@@ -4194,7 +4226,9 @@
         </p:nvSpPr>
         <p:spPr/>
         <p:txBody>
-          <a:bodyPr/>
+          <a:bodyPr>
+            <a:normAutofit fontScale="90000"/>
+          </a:bodyPr>
           <a:lstStyle/>
           <a:p>
             <a:r>
@@ -4273,7 +4307,9 @@
         </p:nvSpPr>
         <p:spPr/>
         <p:txBody>
-          <a:bodyPr/>
+          <a:bodyPr>
+            <a:normAutofit fontScale="90000"/>
+          </a:bodyPr>
           <a:lstStyle/>
           <a:p>
             <a:r>
@@ -4346,7 +4382,9 @@
         </p:nvSpPr>
         <p:spPr/>
         <p:txBody>
-          <a:bodyPr/>
+          <a:bodyPr>
+            <a:normAutofit fontScale="90000"/>
+          </a:bodyPr>
           <a:lstStyle/>
           <a:p>
             <a:r>
@@ -4371,25 +4409,35 @@
           <a:lstStyle/>
           <a:p>
             <a:r>
+              <a:rPr dirty="0"/>
               <a:t>Outcome: PR.PS-02</a:t>
             </a:r>
           </a:p>
           <a:p>
             <a:pPr lvl="1"/>
             <a:r>
+              <a:rPr dirty="0"/>
               <a:t>Current: Inconsistent patching; limited monitoring of biomedical device execution</a:t>
             </a:r>
           </a:p>
           <a:p>
             <a:pPr lvl="1"/>
             <a:r>
+              <a:rPr dirty="0"/>
               <a:t>Target: Defined compensating controls with reproducible, auditable evidence</a:t>
             </a:r>
           </a:p>
           <a:p>
             <a:pPr lvl="1"/>
             <a:r>
-              <a:t>CSF text (Appendix A, p.24): “Software is maintained, replaced, and removed commensurate with risk.”</a:t>
+              <a:t>CSF text (Appendix A, p.2</a:t>
+            </a:r>
+            <a:r>
+              <a:rPr lang="en-US"/>
+              <a:t>0</a:t>
+            </a:r>
+            <a:r>
+              <a:t>): “Software is maintained, replaced, and removed commensurate with risk.”</a:t>
             </a:r>
           </a:p>
         </p:txBody>

</xml_diff>